<commit_message>
add code ch4_2 ...
</commit_message>
<xml_diff>
--- a/ch4/第四章 part2.pptx
+++ b/ch4/第四章 part2.pptx
@@ -292,7 +292,7 @@
           <a:p>
             <a:fld id="{FFB5B9FB-1835-3744-BD38-6A33207CAA68}" type="datetimeFigureOut">
               <a:rPr kumimoji="1" lang="zh-CN" altLang="en-US" smtClean="0"/>
-              <a:t>2020/4/13</a:t>
+              <a:t>2020/4/15</a:t>
             </a:fld>
             <a:endParaRPr kumimoji="1" lang="zh-CN" altLang="en-US"/>
           </a:p>
@@ -490,7 +490,7 @@
           <a:p>
             <a:fld id="{FFB5B9FB-1835-3744-BD38-6A33207CAA68}" type="datetimeFigureOut">
               <a:rPr kumimoji="1" lang="zh-CN" altLang="en-US" smtClean="0"/>
-              <a:t>2020/4/13</a:t>
+              <a:t>2020/4/15</a:t>
             </a:fld>
             <a:endParaRPr kumimoji="1" lang="zh-CN" altLang="en-US"/>
           </a:p>
@@ -698,7 +698,7 @@
           <a:p>
             <a:fld id="{FFB5B9FB-1835-3744-BD38-6A33207CAA68}" type="datetimeFigureOut">
               <a:rPr kumimoji="1" lang="zh-CN" altLang="en-US" smtClean="0"/>
-              <a:t>2020/4/13</a:t>
+              <a:t>2020/4/15</a:t>
             </a:fld>
             <a:endParaRPr kumimoji="1" lang="zh-CN" altLang="en-US"/>
           </a:p>
@@ -896,7 +896,7 @@
           <a:p>
             <a:fld id="{FFB5B9FB-1835-3744-BD38-6A33207CAA68}" type="datetimeFigureOut">
               <a:rPr kumimoji="1" lang="zh-CN" altLang="en-US" smtClean="0"/>
-              <a:t>2020/4/13</a:t>
+              <a:t>2020/4/15</a:t>
             </a:fld>
             <a:endParaRPr kumimoji="1" lang="zh-CN" altLang="en-US"/>
           </a:p>
@@ -1171,7 +1171,7 @@
           <a:p>
             <a:fld id="{FFB5B9FB-1835-3744-BD38-6A33207CAA68}" type="datetimeFigureOut">
               <a:rPr kumimoji="1" lang="zh-CN" altLang="en-US" smtClean="0"/>
-              <a:t>2020/4/13</a:t>
+              <a:t>2020/4/15</a:t>
             </a:fld>
             <a:endParaRPr kumimoji="1" lang="zh-CN" altLang="en-US"/>
           </a:p>
@@ -1436,7 +1436,7 @@
           <a:p>
             <a:fld id="{FFB5B9FB-1835-3744-BD38-6A33207CAA68}" type="datetimeFigureOut">
               <a:rPr kumimoji="1" lang="zh-CN" altLang="en-US" smtClean="0"/>
-              <a:t>2020/4/13</a:t>
+              <a:t>2020/4/15</a:t>
             </a:fld>
             <a:endParaRPr kumimoji="1" lang="zh-CN" altLang="en-US"/>
           </a:p>
@@ -1848,7 +1848,7 @@
           <a:p>
             <a:fld id="{FFB5B9FB-1835-3744-BD38-6A33207CAA68}" type="datetimeFigureOut">
               <a:rPr kumimoji="1" lang="zh-CN" altLang="en-US" smtClean="0"/>
-              <a:t>2020/4/13</a:t>
+              <a:t>2020/4/15</a:t>
             </a:fld>
             <a:endParaRPr kumimoji="1" lang="zh-CN" altLang="en-US"/>
           </a:p>
@@ -1989,7 +1989,7 @@
           <a:p>
             <a:fld id="{FFB5B9FB-1835-3744-BD38-6A33207CAA68}" type="datetimeFigureOut">
               <a:rPr kumimoji="1" lang="zh-CN" altLang="en-US" smtClean="0"/>
-              <a:t>2020/4/13</a:t>
+              <a:t>2020/4/15</a:t>
             </a:fld>
             <a:endParaRPr kumimoji="1" lang="zh-CN" altLang="en-US"/>
           </a:p>
@@ -2102,7 +2102,7 @@
           <a:p>
             <a:fld id="{FFB5B9FB-1835-3744-BD38-6A33207CAA68}" type="datetimeFigureOut">
               <a:rPr kumimoji="1" lang="zh-CN" altLang="en-US" smtClean="0"/>
-              <a:t>2020/4/13</a:t>
+              <a:t>2020/4/15</a:t>
             </a:fld>
             <a:endParaRPr kumimoji="1" lang="zh-CN" altLang="en-US"/>
           </a:p>
@@ -2413,7 +2413,7 @@
           <a:p>
             <a:fld id="{FFB5B9FB-1835-3744-BD38-6A33207CAA68}" type="datetimeFigureOut">
               <a:rPr kumimoji="1" lang="zh-CN" altLang="en-US" smtClean="0"/>
-              <a:t>2020/4/13</a:t>
+              <a:t>2020/4/15</a:t>
             </a:fld>
             <a:endParaRPr kumimoji="1" lang="zh-CN" altLang="en-US"/>
           </a:p>
@@ -2701,7 +2701,7 @@
           <a:p>
             <a:fld id="{FFB5B9FB-1835-3744-BD38-6A33207CAA68}" type="datetimeFigureOut">
               <a:rPr kumimoji="1" lang="zh-CN" altLang="en-US" smtClean="0"/>
-              <a:t>2020/4/13</a:t>
+              <a:t>2020/4/15</a:t>
             </a:fld>
             <a:endParaRPr kumimoji="1" lang="zh-CN" altLang="en-US"/>
           </a:p>
@@ -2942,7 +2942,7 @@
           <a:p>
             <a:fld id="{FFB5B9FB-1835-3744-BD38-6A33207CAA68}" type="datetimeFigureOut">
               <a:rPr kumimoji="1" lang="zh-CN" altLang="en-US" smtClean="0"/>
-              <a:t>2020/4/13</a:t>
+              <a:t>2020/4/15</a:t>
             </a:fld>
             <a:endParaRPr kumimoji="1" lang="zh-CN" altLang="en-US"/>
           </a:p>
@@ -10507,7 +10507,7 @@
                 <a:spcPts val="1000"/>
               </a:spcBef>
               <a:buFont typeface="+mj-lt"/>
-              <a:buAutoNum type="arabicPeriod" startAt="7"/>
+              <a:buAutoNum type="arabicPeriod" startAt="10"/>
             </a:pPr>
             <a:r>
               <a:rPr kumimoji="1" lang="zh-CN" altLang="en-US" sz="1800" dirty="0"/>
@@ -10549,7 +10549,7 @@
                 <a:spcPts val="1000"/>
               </a:spcBef>
               <a:buFont typeface="+mj-lt"/>
-              <a:buAutoNum type="arabicPeriod" startAt="7"/>
+              <a:buAutoNum type="arabicPeriod" startAt="10"/>
             </a:pPr>
             <a:endParaRPr kumimoji="1" lang="en-US" altLang="zh-CN" sz="1800" dirty="0"/>
           </a:p>
@@ -10559,7 +10559,7 @@
                 <a:spcPts val="1000"/>
               </a:spcBef>
               <a:buFont typeface="+mj-lt"/>
-              <a:buAutoNum type="arabicPeriod" startAt="7"/>
+              <a:buAutoNum type="arabicPeriod" startAt="10"/>
             </a:pPr>
             <a:r>
               <a:rPr kumimoji="1" lang="en-US" altLang="zh-CN" sz="1800" dirty="0"/>

</xml_diff>